<commit_message>
Uploading Logo and ppt
</commit_message>
<xml_diff>
--- a/GPUs.pptx
+++ b/GPUs.pptx
@@ -104,6 +104,11 @@
       </a:defRPr>
     </a:lvl9pPr>
   </p:defaultTextStyle>
+  <p:extLst>
+    <p:ext uri="{EFAFB233-063F-42B5-8137-9DF3F51BA10A}">
+      <p15:sldGuideLst xmlns:p15="http://schemas.microsoft.com/office/powerpoint/2012/main"/>
+    </p:ext>
+  </p:extLst>
 </p:presentation>
 </file>
 
@@ -164,7 +169,7 @@
           <a:noFill/>
           <a:extLst>
             <a:ext uri="{909E8E84-426E-40dd-AFC4-6F175D3DCCD1}">
-              <a14:hiddenFill xmlns:a14="http://schemas.microsoft.com/office/drawing/2010/main" xmlns="">
+              <a14:hiddenFill xmlns="" xmlns:a14="http://schemas.microsoft.com/office/drawing/2010/main">
                 <a:solidFill>
                   <a:srgbClr val="FFFFFF"/>
                 </a:solidFill>
@@ -223,7 +228,7 @@
             </a:ln>
             <a:extLst>
               <a:ext uri="{91240B29-F687-4f45-9708-019B960494DF}">
-                <a14:hiddenLine xmlns:a14="http://schemas.microsoft.com/office/drawing/2010/main" xmlns="" w="9525">
+                <a14:hiddenLine xmlns="" xmlns:a14="http://schemas.microsoft.com/office/drawing/2010/main" w="9525">
                   <a:solidFill>
                     <a:srgbClr val="000000"/>
                   </a:solidFill>
@@ -313,7 +318,7 @@
             </a:ln>
             <a:extLst>
               <a:ext uri="{91240B29-F687-4f45-9708-019B960494DF}">
-                <a14:hiddenLine xmlns:a14="http://schemas.microsoft.com/office/drawing/2010/main" xmlns="" w="9525">
+                <a14:hiddenLine xmlns="" xmlns:a14="http://schemas.microsoft.com/office/drawing/2010/main" w="9525">
                   <a:solidFill>
                     <a:srgbClr val="000000"/>
                   </a:solidFill>
@@ -403,7 +408,7 @@
             </a:ln>
             <a:extLst>
               <a:ext uri="{91240B29-F687-4f45-9708-019B960494DF}">
-                <a14:hiddenLine xmlns:a14="http://schemas.microsoft.com/office/drawing/2010/main" xmlns="" w="9525">
+                <a14:hiddenLine xmlns="" xmlns:a14="http://schemas.microsoft.com/office/drawing/2010/main" w="9525">
                   <a:solidFill>
                     <a:srgbClr val="000000"/>
                   </a:solidFill>
@@ -437,7 +442,7 @@
             </a:ln>
             <a:extLst>
               <a:ext uri="{91240B29-F687-4f45-9708-019B960494DF}">
-                <a14:hiddenLine xmlns:a14="http://schemas.microsoft.com/office/drawing/2010/main" xmlns="" w="9525">
+                <a14:hiddenLine xmlns="" xmlns:a14="http://schemas.microsoft.com/office/drawing/2010/main" w="9525">
                   <a:solidFill>
                     <a:srgbClr val="000000"/>
                   </a:solidFill>
@@ -527,7 +532,7 @@
             </a:ln>
             <a:extLst>
               <a:ext uri="{91240B29-F687-4f45-9708-019B960494DF}">
-                <a14:hiddenLine xmlns:a14="http://schemas.microsoft.com/office/drawing/2010/main" xmlns="" w="9525">
+                <a14:hiddenLine xmlns="" xmlns:a14="http://schemas.microsoft.com/office/drawing/2010/main" w="9525">
                   <a:solidFill>
                     <a:srgbClr val="000000"/>
                   </a:solidFill>
@@ -589,7 +594,7 @@
             </a:ln>
             <a:extLst>
               <a:ext uri="{91240B29-F687-4f45-9708-019B960494DF}">
-                <a14:hiddenLine xmlns:a14="http://schemas.microsoft.com/office/drawing/2010/main" xmlns="" w="9525">
+                <a14:hiddenLine xmlns="" xmlns:a14="http://schemas.microsoft.com/office/drawing/2010/main" w="9525">
                   <a:solidFill>
                     <a:srgbClr val="000000"/>
                   </a:solidFill>
@@ -651,7 +656,7 @@
             </a:ln>
             <a:extLst>
               <a:ext uri="{91240B29-F687-4f45-9708-019B960494DF}">
-                <a14:hiddenLine xmlns:a14="http://schemas.microsoft.com/office/drawing/2010/main" xmlns="" w="9525">
+                <a14:hiddenLine xmlns="" xmlns:a14="http://schemas.microsoft.com/office/drawing/2010/main" w="9525">
                   <a:solidFill>
                     <a:srgbClr val="000000"/>
                   </a:solidFill>
@@ -741,7 +746,7 @@
             </a:ln>
             <a:extLst>
               <a:ext uri="{91240B29-F687-4f45-9708-019B960494DF}">
-                <a14:hiddenLine xmlns:a14="http://schemas.microsoft.com/office/drawing/2010/main" xmlns="" w="9525">
+                <a14:hiddenLine xmlns="" xmlns:a14="http://schemas.microsoft.com/office/drawing/2010/main" w="9525">
                   <a:solidFill>
                     <a:srgbClr val="000000"/>
                   </a:solidFill>
@@ -803,7 +808,7 @@
             </a:ln>
             <a:extLst>
               <a:ext uri="{91240B29-F687-4f45-9708-019B960494DF}">
-                <a14:hiddenLine xmlns:a14="http://schemas.microsoft.com/office/drawing/2010/main" xmlns="" w="9525">
+                <a14:hiddenLine xmlns="" xmlns:a14="http://schemas.microsoft.com/office/drawing/2010/main" w="9525">
                   <a:solidFill>
                     <a:srgbClr val="000000"/>
                   </a:solidFill>
@@ -865,7 +870,7 @@
             </a:ln>
             <a:extLst>
               <a:ext uri="{91240B29-F687-4f45-9708-019B960494DF}">
-                <a14:hiddenLine xmlns:a14="http://schemas.microsoft.com/office/drawing/2010/main" xmlns="" w="9525">
+                <a14:hiddenLine xmlns="" xmlns:a14="http://schemas.microsoft.com/office/drawing/2010/main" w="9525">
                   <a:solidFill>
                     <a:srgbClr val="000000"/>
                   </a:solidFill>
@@ -955,7 +960,7 @@
             </a:ln>
             <a:extLst>
               <a:ext uri="{91240B29-F687-4f45-9708-019B960494DF}">
-                <a14:hiddenLine xmlns:a14="http://schemas.microsoft.com/office/drawing/2010/main" xmlns="" w="9525">
+                <a14:hiddenLine xmlns="" xmlns:a14="http://schemas.microsoft.com/office/drawing/2010/main" w="9525">
                   <a:solidFill>
                     <a:srgbClr val="000000"/>
                   </a:solidFill>
@@ -1045,7 +1050,7 @@
             </a:ln>
             <a:extLst>
               <a:ext uri="{91240B29-F687-4f45-9708-019B960494DF}">
-                <a14:hiddenLine xmlns:a14="http://schemas.microsoft.com/office/drawing/2010/main" xmlns="" w="9525">
+                <a14:hiddenLine xmlns="" xmlns:a14="http://schemas.microsoft.com/office/drawing/2010/main" w="9525">
                   <a:solidFill>
                     <a:srgbClr val="000000"/>
                   </a:solidFill>
@@ -1107,7 +1112,7 @@
             </a:ln>
             <a:extLst>
               <a:ext uri="{91240B29-F687-4f45-9708-019B960494DF}">
-                <a14:hiddenLine xmlns:a14="http://schemas.microsoft.com/office/drawing/2010/main" xmlns="" w="9525">
+                <a14:hiddenLine xmlns="" xmlns:a14="http://schemas.microsoft.com/office/drawing/2010/main" w="9525">
                   <a:solidFill>
                     <a:srgbClr val="000000"/>
                   </a:solidFill>
@@ -1217,7 +1222,7 @@
             </a:ln>
             <a:extLst>
               <a:ext uri="{91240B29-F687-4f45-9708-019B960494DF}">
-                <a14:hiddenLine xmlns:a14="http://schemas.microsoft.com/office/drawing/2010/main" xmlns="" w="9525">
+                <a14:hiddenLine xmlns="" xmlns:a14="http://schemas.microsoft.com/office/drawing/2010/main" w="9525">
                   <a:solidFill>
                     <a:srgbClr val="000000"/>
                   </a:solidFill>
@@ -1279,7 +1284,7 @@
             </a:ln>
             <a:extLst>
               <a:ext uri="{91240B29-F687-4f45-9708-019B960494DF}">
-                <a14:hiddenLine xmlns:a14="http://schemas.microsoft.com/office/drawing/2010/main" xmlns="" w="9525">
+                <a14:hiddenLine xmlns="" xmlns:a14="http://schemas.microsoft.com/office/drawing/2010/main" w="9525">
                   <a:solidFill>
                     <a:srgbClr val="000000"/>
                   </a:solidFill>
@@ -1369,7 +1374,7 @@
             </a:ln>
             <a:extLst>
               <a:ext uri="{91240B29-F687-4f45-9708-019B960494DF}">
-                <a14:hiddenLine xmlns:a14="http://schemas.microsoft.com/office/drawing/2010/main" xmlns="" w="9525">
+                <a14:hiddenLine xmlns="" xmlns:a14="http://schemas.microsoft.com/office/drawing/2010/main" w="9525">
                   <a:solidFill>
                     <a:srgbClr val="000000"/>
                   </a:solidFill>
@@ -1459,7 +1464,7 @@
             </a:ln>
             <a:extLst>
               <a:ext uri="{91240B29-F687-4f45-9708-019B960494DF}">
-                <a14:hiddenLine xmlns:a14="http://schemas.microsoft.com/office/drawing/2010/main" xmlns="" w="9525">
+                <a14:hiddenLine xmlns="" xmlns:a14="http://schemas.microsoft.com/office/drawing/2010/main" w="9525">
                   <a:solidFill>
                     <a:srgbClr val="000000"/>
                   </a:solidFill>
@@ -1521,7 +1526,7 @@
             </a:ln>
             <a:extLst>
               <a:ext uri="{91240B29-F687-4f45-9708-019B960494DF}">
-                <a14:hiddenLine xmlns:a14="http://schemas.microsoft.com/office/drawing/2010/main" xmlns="" w="9525">
+                <a14:hiddenLine xmlns="" xmlns:a14="http://schemas.microsoft.com/office/drawing/2010/main" w="9525">
                   <a:solidFill>
                     <a:srgbClr val="000000"/>
                   </a:solidFill>
@@ -1611,7 +1616,7 @@
             </a:ln>
             <a:extLst>
               <a:ext uri="{91240B29-F687-4f45-9708-019B960494DF}">
-                <a14:hiddenLine xmlns:a14="http://schemas.microsoft.com/office/drawing/2010/main" xmlns="" w="9525">
+                <a14:hiddenLine xmlns="" xmlns:a14="http://schemas.microsoft.com/office/drawing/2010/main" w="9525">
                   <a:solidFill>
                     <a:srgbClr val="000000"/>
                   </a:solidFill>
@@ -1701,7 +1706,7 @@
             </a:ln>
             <a:extLst>
               <a:ext uri="{91240B29-F687-4f45-9708-019B960494DF}">
-                <a14:hiddenLine xmlns:a14="http://schemas.microsoft.com/office/drawing/2010/main" xmlns="" w="9525">
+                <a14:hiddenLine xmlns="" xmlns:a14="http://schemas.microsoft.com/office/drawing/2010/main" w="9525">
                   <a:solidFill>
                     <a:srgbClr val="000000"/>
                   </a:solidFill>
@@ -1757,7 +1762,7 @@
             </a:ln>
             <a:extLst>
               <a:ext uri="{91240B29-F687-4f45-9708-019B960494DF}">
-                <a14:hiddenLine xmlns:a14="http://schemas.microsoft.com/office/drawing/2010/main" xmlns="" w="9525">
+                <a14:hiddenLine xmlns="" xmlns:a14="http://schemas.microsoft.com/office/drawing/2010/main" w="9525">
                   <a:solidFill>
                     <a:srgbClr val="000000"/>
                   </a:solidFill>
@@ -1847,7 +1852,7 @@
             </a:ln>
             <a:extLst>
               <a:ext uri="{91240B29-F687-4f45-9708-019B960494DF}">
-                <a14:hiddenLine xmlns:a14="http://schemas.microsoft.com/office/drawing/2010/main" xmlns="" w="9525">
+                <a14:hiddenLine xmlns="" xmlns:a14="http://schemas.microsoft.com/office/drawing/2010/main" w="9525">
                   <a:solidFill>
                     <a:srgbClr val="000000"/>
                   </a:solidFill>
@@ -1903,7 +1908,7 @@
             </a:ln>
             <a:extLst>
               <a:ext uri="{91240B29-F687-4f45-9708-019B960494DF}">
-                <a14:hiddenLine xmlns:a14="http://schemas.microsoft.com/office/drawing/2010/main" xmlns="" w="9525">
+                <a14:hiddenLine xmlns="" xmlns:a14="http://schemas.microsoft.com/office/drawing/2010/main" w="9525">
                   <a:solidFill>
                     <a:srgbClr val="000000"/>
                   </a:solidFill>
@@ -1993,7 +1998,7 @@
             </a:ln>
             <a:extLst>
               <a:ext uri="{91240B29-F687-4f45-9708-019B960494DF}">
-                <a14:hiddenLine xmlns:a14="http://schemas.microsoft.com/office/drawing/2010/main" xmlns="" w="9525">
+                <a14:hiddenLine xmlns="" xmlns:a14="http://schemas.microsoft.com/office/drawing/2010/main" w="9525">
                   <a:solidFill>
                     <a:srgbClr val="000000"/>
                   </a:solidFill>
@@ -2061,7 +2066,7 @@
             </a:ln>
             <a:extLst>
               <a:ext uri="{91240B29-F687-4f45-9708-019B960494DF}">
-                <a14:hiddenLine xmlns:a14="http://schemas.microsoft.com/office/drawing/2010/main" xmlns="" w="9525">
+                <a14:hiddenLine xmlns="" xmlns:a14="http://schemas.microsoft.com/office/drawing/2010/main" w="9525">
                   <a:solidFill>
                     <a:srgbClr val="000000"/>
                   </a:solidFill>
@@ -2151,7 +2156,7 @@
             </a:ln>
             <a:extLst>
               <a:ext uri="{91240B29-F687-4f45-9708-019B960494DF}">
-                <a14:hiddenLine xmlns:a14="http://schemas.microsoft.com/office/drawing/2010/main" xmlns="" w="9525">
+                <a14:hiddenLine xmlns="" xmlns:a14="http://schemas.microsoft.com/office/drawing/2010/main" w="9525">
                   <a:solidFill>
                     <a:srgbClr val="000000"/>
                   </a:solidFill>
@@ -2219,7 +2224,7 @@
             </a:ln>
             <a:extLst>
               <a:ext uri="{91240B29-F687-4f45-9708-019B960494DF}">
-                <a14:hiddenLine xmlns:a14="http://schemas.microsoft.com/office/drawing/2010/main" xmlns="" w="9525">
+                <a14:hiddenLine xmlns="" xmlns:a14="http://schemas.microsoft.com/office/drawing/2010/main" w="9525">
                   <a:solidFill>
                     <a:srgbClr val="000000"/>
                   </a:solidFill>
@@ -2309,7 +2314,7 @@
             </a:ln>
             <a:extLst>
               <a:ext uri="{91240B29-F687-4f45-9708-019B960494DF}">
-                <a14:hiddenLine xmlns:a14="http://schemas.microsoft.com/office/drawing/2010/main" xmlns="" w="9525">
+                <a14:hiddenLine xmlns="" xmlns:a14="http://schemas.microsoft.com/office/drawing/2010/main" w="9525">
                   <a:solidFill>
                     <a:srgbClr val="000000"/>
                   </a:solidFill>
@@ -2343,7 +2348,7 @@
             </a:ln>
             <a:extLst>
               <a:ext uri="{91240B29-F687-4f45-9708-019B960494DF}">
-                <a14:hiddenLine xmlns:a14="http://schemas.microsoft.com/office/drawing/2010/main" xmlns="" w="9525">
+                <a14:hiddenLine xmlns="" xmlns:a14="http://schemas.microsoft.com/office/drawing/2010/main" w="9525">
                   <a:solidFill>
                     <a:srgbClr val="000000"/>
                   </a:solidFill>
@@ -2433,7 +2438,7 @@
             </a:ln>
             <a:extLst>
               <a:ext uri="{91240B29-F687-4f45-9708-019B960494DF}">
-                <a14:hiddenLine xmlns:a14="http://schemas.microsoft.com/office/drawing/2010/main" xmlns="" w="9525">
+                <a14:hiddenLine xmlns="" xmlns:a14="http://schemas.microsoft.com/office/drawing/2010/main" w="9525">
                   <a:solidFill>
                     <a:srgbClr val="000000"/>
                   </a:solidFill>
@@ -2495,7 +2500,7 @@
             </a:ln>
             <a:extLst>
               <a:ext uri="{91240B29-F687-4f45-9708-019B960494DF}">
-                <a14:hiddenLine xmlns:a14="http://schemas.microsoft.com/office/drawing/2010/main" xmlns="" w="9525">
+                <a14:hiddenLine xmlns="" xmlns:a14="http://schemas.microsoft.com/office/drawing/2010/main" w="9525">
                   <a:solidFill>
                     <a:srgbClr val="000000"/>
                   </a:solidFill>
@@ -2557,7 +2562,7 @@
             </a:ln>
             <a:extLst>
               <a:ext uri="{91240B29-F687-4f45-9708-019B960494DF}">
-                <a14:hiddenLine xmlns:a14="http://schemas.microsoft.com/office/drawing/2010/main" xmlns="" w="9525">
+                <a14:hiddenLine xmlns="" xmlns:a14="http://schemas.microsoft.com/office/drawing/2010/main" w="9525">
                   <a:solidFill>
                     <a:srgbClr val="000000"/>
                   </a:solidFill>
@@ -2647,7 +2652,7 @@
             </a:ln>
             <a:extLst>
               <a:ext uri="{91240B29-F687-4f45-9708-019B960494DF}">
-                <a14:hiddenLine xmlns:a14="http://schemas.microsoft.com/office/drawing/2010/main" xmlns="" w="9525">
+                <a14:hiddenLine xmlns="" xmlns:a14="http://schemas.microsoft.com/office/drawing/2010/main" w="9525">
                   <a:solidFill>
                     <a:srgbClr val="000000"/>
                   </a:solidFill>
@@ -2715,7 +2720,7 @@
             </a:ln>
             <a:extLst>
               <a:ext uri="{91240B29-F687-4f45-9708-019B960494DF}">
-                <a14:hiddenLine xmlns:a14="http://schemas.microsoft.com/office/drawing/2010/main" xmlns="" w="9525">
+                <a14:hiddenLine xmlns="" xmlns:a14="http://schemas.microsoft.com/office/drawing/2010/main" w="9525">
                   <a:solidFill>
                     <a:srgbClr val="000000"/>
                   </a:solidFill>
@@ -2777,7 +2782,7 @@
             </a:ln>
             <a:extLst>
               <a:ext uri="{91240B29-F687-4f45-9708-019B960494DF}">
-                <a14:hiddenLine xmlns:a14="http://schemas.microsoft.com/office/drawing/2010/main" xmlns="" w="9525">
+                <a14:hiddenLine xmlns="" xmlns:a14="http://schemas.microsoft.com/office/drawing/2010/main" w="9525">
                   <a:solidFill>
                     <a:srgbClr val="000000"/>
                   </a:solidFill>
@@ -2867,7 +2872,7 @@
             </a:ln>
             <a:extLst>
               <a:ext uri="{91240B29-F687-4f45-9708-019B960494DF}">
-                <a14:hiddenLine xmlns:a14="http://schemas.microsoft.com/office/drawing/2010/main" xmlns="" w="9525">
+                <a14:hiddenLine xmlns="" xmlns:a14="http://schemas.microsoft.com/office/drawing/2010/main" w="9525">
                   <a:solidFill>
                     <a:srgbClr val="000000"/>
                   </a:solidFill>
@@ -2929,7 +2934,7 @@
             </a:ln>
             <a:extLst>
               <a:ext uri="{91240B29-F687-4f45-9708-019B960494DF}">
-                <a14:hiddenLine xmlns:a14="http://schemas.microsoft.com/office/drawing/2010/main" xmlns="" w="9525">
+                <a14:hiddenLine xmlns="" xmlns:a14="http://schemas.microsoft.com/office/drawing/2010/main" w="9525">
                   <a:solidFill>
                     <a:srgbClr val="000000"/>
                   </a:solidFill>
@@ -3019,7 +3024,7 @@
             </a:ln>
             <a:extLst>
               <a:ext uri="{91240B29-F687-4f45-9708-019B960494DF}">
-                <a14:hiddenLine xmlns:a14="http://schemas.microsoft.com/office/drawing/2010/main" xmlns="" w="9525">
+                <a14:hiddenLine xmlns="" xmlns:a14="http://schemas.microsoft.com/office/drawing/2010/main" w="9525">
                   <a:solidFill>
                     <a:srgbClr val="000000"/>
                   </a:solidFill>
@@ -3081,7 +3086,7 @@
             </a:ln>
             <a:extLst>
               <a:ext uri="{91240B29-F687-4f45-9708-019B960494DF}">
-                <a14:hiddenLine xmlns:a14="http://schemas.microsoft.com/office/drawing/2010/main" xmlns="" w="9525">
+                <a14:hiddenLine xmlns="" xmlns:a14="http://schemas.microsoft.com/office/drawing/2010/main" w="9525">
                   <a:solidFill>
                     <a:srgbClr val="000000"/>
                   </a:solidFill>
@@ -3171,7 +3176,7 @@
             </a:ln>
             <a:extLst>
               <a:ext uri="{91240B29-F687-4f45-9708-019B960494DF}">
-                <a14:hiddenLine xmlns:a14="http://schemas.microsoft.com/office/drawing/2010/main" xmlns="" w="9525">
+                <a14:hiddenLine xmlns="" xmlns:a14="http://schemas.microsoft.com/office/drawing/2010/main" w="9525">
                   <a:solidFill>
                     <a:srgbClr val="000000"/>
                   </a:solidFill>
@@ -3205,7 +3210,7 @@
             </a:ln>
             <a:extLst>
               <a:ext uri="{91240B29-F687-4f45-9708-019B960494DF}">
-                <a14:hiddenLine xmlns:a14="http://schemas.microsoft.com/office/drawing/2010/main" xmlns="" w="9525">
+                <a14:hiddenLine xmlns="" xmlns:a14="http://schemas.microsoft.com/office/drawing/2010/main" w="9525">
                   <a:solidFill>
                     <a:srgbClr val="000000"/>
                   </a:solidFill>
@@ -3270,7 +3275,7 @@
             </a:ln>
             <a:extLst>
               <a:ext uri="{91240B29-F687-4f45-9708-019B960494DF}">
-                <a14:hiddenLine xmlns:a14="http://schemas.microsoft.com/office/drawing/2010/main" xmlns="" w="9525">
+                <a14:hiddenLine xmlns="" xmlns:a14="http://schemas.microsoft.com/office/drawing/2010/main" w="9525">
                   <a:solidFill>
                     <a:srgbClr val="000000"/>
                   </a:solidFill>
@@ -3360,7 +3365,7 @@
             </a:ln>
             <a:extLst>
               <a:ext uri="{91240B29-F687-4f45-9708-019B960494DF}">
-                <a14:hiddenLine xmlns:a14="http://schemas.microsoft.com/office/drawing/2010/main" xmlns="" w="9525">
+                <a14:hiddenLine xmlns="" xmlns:a14="http://schemas.microsoft.com/office/drawing/2010/main" w="9525">
                   <a:solidFill>
                     <a:srgbClr val="000000"/>
                   </a:solidFill>
@@ -3422,7 +3427,7 @@
             </a:ln>
             <a:extLst>
               <a:ext uri="{91240B29-F687-4f45-9708-019B960494DF}">
-                <a14:hiddenLine xmlns:a14="http://schemas.microsoft.com/office/drawing/2010/main" xmlns="" w="9525">
+                <a14:hiddenLine xmlns="" xmlns:a14="http://schemas.microsoft.com/office/drawing/2010/main" w="9525">
                   <a:solidFill>
                     <a:srgbClr val="000000"/>
                   </a:solidFill>
@@ -3512,7 +3517,7 @@
             </a:ln>
             <a:extLst>
               <a:ext uri="{91240B29-F687-4f45-9708-019B960494DF}">
-                <a14:hiddenLine xmlns:a14="http://schemas.microsoft.com/office/drawing/2010/main" xmlns="" w="9525">
+                <a14:hiddenLine xmlns="" xmlns:a14="http://schemas.microsoft.com/office/drawing/2010/main" w="9525">
                   <a:solidFill>
                     <a:srgbClr val="000000"/>
                   </a:solidFill>
@@ -3602,7 +3607,7 @@
             </a:ln>
             <a:extLst>
               <a:ext uri="{91240B29-F687-4f45-9708-019B960494DF}">
-                <a14:hiddenLine xmlns:a14="http://schemas.microsoft.com/office/drawing/2010/main" xmlns="" w="9525">
+                <a14:hiddenLine xmlns="" xmlns:a14="http://schemas.microsoft.com/office/drawing/2010/main" w="9525">
                   <a:solidFill>
                     <a:srgbClr val="000000"/>
                   </a:solidFill>
@@ -3667,7 +3672,7 @@
             </a:ln>
             <a:extLst>
               <a:ext uri="{91240B29-F687-4f45-9708-019B960494DF}">
-                <a14:hiddenLine xmlns:a14="http://schemas.microsoft.com/office/drawing/2010/main" xmlns="" w="9525">
+                <a14:hiddenLine xmlns="" xmlns:a14="http://schemas.microsoft.com/office/drawing/2010/main" w="9525">
                   <a:solidFill>
                     <a:srgbClr val="000000"/>
                   </a:solidFill>
@@ -3729,7 +3734,7 @@
             </a:ln>
             <a:extLst>
               <a:ext uri="{91240B29-F687-4f45-9708-019B960494DF}">
-                <a14:hiddenLine xmlns:a14="http://schemas.microsoft.com/office/drawing/2010/main" xmlns="" w="9525">
+                <a14:hiddenLine xmlns="" xmlns:a14="http://schemas.microsoft.com/office/drawing/2010/main" w="9525">
                   <a:solidFill>
                     <a:srgbClr val="000000"/>
                   </a:solidFill>
@@ -3819,7 +3824,7 @@
             </a:ln>
             <a:extLst>
               <a:ext uri="{91240B29-F687-4f45-9708-019B960494DF}">
-                <a14:hiddenLine xmlns:a14="http://schemas.microsoft.com/office/drawing/2010/main" xmlns="" w="9525">
+                <a14:hiddenLine xmlns="" xmlns:a14="http://schemas.microsoft.com/office/drawing/2010/main" w="9525">
                   <a:solidFill>
                     <a:srgbClr val="000000"/>
                   </a:solidFill>
@@ -3909,7 +3914,7 @@
             </a:ln>
             <a:extLst>
               <a:ext uri="{91240B29-F687-4f45-9708-019B960494DF}">
-                <a14:hiddenLine xmlns:a14="http://schemas.microsoft.com/office/drawing/2010/main" xmlns="" w="9525">
+                <a14:hiddenLine xmlns="" xmlns:a14="http://schemas.microsoft.com/office/drawing/2010/main" w="9525">
                   <a:solidFill>
                     <a:srgbClr val="000000"/>
                   </a:solidFill>
@@ -3971,7 +3976,7 @@
             </a:ln>
             <a:extLst>
               <a:ext uri="{91240B29-F687-4f45-9708-019B960494DF}">
-                <a14:hiddenLine xmlns:a14="http://schemas.microsoft.com/office/drawing/2010/main" xmlns="" w="9525">
+                <a14:hiddenLine xmlns="" xmlns:a14="http://schemas.microsoft.com/office/drawing/2010/main" w="9525">
                   <a:solidFill>
                     <a:srgbClr val="000000"/>
                   </a:solidFill>
@@ -4091,7 +4096,7 @@
             </a:ln>
             <a:extLst>
               <a:ext uri="{91240B29-F687-4f45-9708-019B960494DF}">
-                <a14:hiddenLine xmlns:a14="http://schemas.microsoft.com/office/drawing/2010/main" xmlns="" w="9525">
+                <a14:hiddenLine xmlns="" xmlns:a14="http://schemas.microsoft.com/office/drawing/2010/main" w="9525">
                   <a:solidFill>
                     <a:srgbClr val="000000"/>
                   </a:solidFill>
@@ -4159,7 +4164,7 @@
             </a:ln>
             <a:extLst>
               <a:ext uri="{91240B29-F687-4f45-9708-019B960494DF}">
-                <a14:hiddenLine xmlns:a14="http://schemas.microsoft.com/office/drawing/2010/main" xmlns="" w="9525">
+                <a14:hiddenLine xmlns="" xmlns:a14="http://schemas.microsoft.com/office/drawing/2010/main" w="9525">
                   <a:solidFill>
                     <a:srgbClr val="000000"/>
                   </a:solidFill>
@@ -4249,7 +4254,7 @@
             </a:ln>
             <a:extLst>
               <a:ext uri="{91240B29-F687-4f45-9708-019B960494DF}">
-                <a14:hiddenLine xmlns:a14="http://schemas.microsoft.com/office/drawing/2010/main" xmlns="" w="9525">
+                <a14:hiddenLine xmlns="" xmlns:a14="http://schemas.microsoft.com/office/drawing/2010/main" w="9525">
                   <a:solidFill>
                     <a:srgbClr val="000000"/>
                   </a:solidFill>
@@ -8978,7 +8983,7 @@
           <a:noFill/>
           <a:extLst>
             <a:ext uri="{909E8E84-426E-40dd-AFC4-6F175D3DCCD1}">
-              <a14:hiddenFill xmlns:a14="http://schemas.microsoft.com/office/drawing/2010/main" xmlns="">
+              <a14:hiddenFill xmlns="" xmlns:a14="http://schemas.microsoft.com/office/drawing/2010/main">
                 <a:solidFill>
                   <a:srgbClr val="FFFFFF"/>
                 </a:solidFill>
@@ -9052,7 +9057,7 @@
               </a:ln>
               <a:extLst>
                 <a:ext uri="{91240B29-F687-4f45-9708-019B960494DF}">
-                  <a14:hiddenLine xmlns:a14="http://schemas.microsoft.com/office/drawing/2010/main" xmlns="" w="9525">
+                  <a14:hiddenLine xmlns="" xmlns:a14="http://schemas.microsoft.com/office/drawing/2010/main" w="9525">
                     <a:solidFill>
                       <a:srgbClr val="000000"/>
                     </a:solidFill>
@@ -9142,7 +9147,7 @@
               </a:ln>
               <a:extLst>
                 <a:ext uri="{91240B29-F687-4f45-9708-019B960494DF}">
-                  <a14:hiddenLine xmlns:a14="http://schemas.microsoft.com/office/drawing/2010/main" xmlns="" w="9525">
+                  <a14:hiddenLine xmlns="" xmlns:a14="http://schemas.microsoft.com/office/drawing/2010/main" w="9525">
                     <a:solidFill>
                       <a:srgbClr val="000000"/>
                     </a:solidFill>
@@ -9232,7 +9237,7 @@
               </a:ln>
               <a:extLst>
                 <a:ext uri="{91240B29-F687-4f45-9708-019B960494DF}">
-                  <a14:hiddenLine xmlns:a14="http://schemas.microsoft.com/office/drawing/2010/main" xmlns="" w="9525">
+                  <a14:hiddenLine xmlns="" xmlns:a14="http://schemas.microsoft.com/office/drawing/2010/main" w="9525">
                     <a:solidFill>
                       <a:srgbClr val="000000"/>
                     </a:solidFill>
@@ -9294,7 +9299,7 @@
               </a:ln>
               <a:extLst>
                 <a:ext uri="{91240B29-F687-4f45-9708-019B960494DF}">
-                  <a14:hiddenLine xmlns:a14="http://schemas.microsoft.com/office/drawing/2010/main" xmlns="" w="9525">
+                  <a14:hiddenLine xmlns="" xmlns:a14="http://schemas.microsoft.com/office/drawing/2010/main" w="9525">
                     <a:solidFill>
                       <a:srgbClr val="000000"/>
                     </a:solidFill>
@@ -9384,7 +9389,7 @@
               </a:ln>
               <a:extLst>
                 <a:ext uri="{91240B29-F687-4f45-9708-019B960494DF}">
-                  <a14:hiddenLine xmlns:a14="http://schemas.microsoft.com/office/drawing/2010/main" xmlns="" w="9525">
+                  <a14:hiddenLine xmlns="" xmlns:a14="http://schemas.microsoft.com/office/drawing/2010/main" w="9525">
                     <a:solidFill>
                       <a:srgbClr val="000000"/>
                     </a:solidFill>
@@ -9446,7 +9451,7 @@
               </a:ln>
               <a:extLst>
                 <a:ext uri="{91240B29-F687-4f45-9708-019B960494DF}">
-                  <a14:hiddenLine xmlns:a14="http://schemas.microsoft.com/office/drawing/2010/main" xmlns="" w="9525">
+                  <a14:hiddenLine xmlns="" xmlns:a14="http://schemas.microsoft.com/office/drawing/2010/main" w="9525">
                     <a:solidFill>
                       <a:srgbClr val="000000"/>
                     </a:solidFill>
@@ -9508,7 +9513,7 @@
               </a:ln>
               <a:extLst>
                 <a:ext uri="{91240B29-F687-4f45-9708-019B960494DF}">
-                  <a14:hiddenLine xmlns:a14="http://schemas.microsoft.com/office/drawing/2010/main" xmlns="" w="9525">
+                  <a14:hiddenLine xmlns="" xmlns:a14="http://schemas.microsoft.com/office/drawing/2010/main" w="9525">
                     <a:solidFill>
                       <a:srgbClr val="000000"/>
                     </a:solidFill>
@@ -9598,7 +9603,7 @@
               </a:ln>
               <a:extLst>
                 <a:ext uri="{91240B29-F687-4f45-9708-019B960494DF}">
-                  <a14:hiddenLine xmlns:a14="http://schemas.microsoft.com/office/drawing/2010/main" xmlns="" w="9525">
+                  <a14:hiddenLine xmlns="" xmlns:a14="http://schemas.microsoft.com/office/drawing/2010/main" w="9525">
                     <a:solidFill>
                       <a:srgbClr val="000000"/>
                     </a:solidFill>
@@ -9688,7 +9693,7 @@
               </a:ln>
               <a:extLst>
                 <a:ext uri="{91240B29-F687-4f45-9708-019B960494DF}">
-                  <a14:hiddenLine xmlns:a14="http://schemas.microsoft.com/office/drawing/2010/main" xmlns="" w="9525">
+                  <a14:hiddenLine xmlns="" xmlns:a14="http://schemas.microsoft.com/office/drawing/2010/main" w="9525">
                     <a:solidFill>
                       <a:srgbClr val="000000"/>
                     </a:solidFill>
@@ -9750,7 +9755,7 @@
               </a:ln>
               <a:extLst>
                 <a:ext uri="{91240B29-F687-4f45-9708-019B960494DF}">
-                  <a14:hiddenLine xmlns:a14="http://schemas.microsoft.com/office/drawing/2010/main" xmlns="" w="9525">
+                  <a14:hiddenLine xmlns="" xmlns:a14="http://schemas.microsoft.com/office/drawing/2010/main" w="9525">
                     <a:solidFill>
                       <a:srgbClr val="000000"/>
                     </a:solidFill>
@@ -9860,7 +9865,7 @@
               </a:ln>
               <a:extLst>
                 <a:ext uri="{91240B29-F687-4f45-9708-019B960494DF}">
-                  <a14:hiddenLine xmlns:a14="http://schemas.microsoft.com/office/drawing/2010/main" xmlns="" w="9525">
+                  <a14:hiddenLine xmlns="" xmlns:a14="http://schemas.microsoft.com/office/drawing/2010/main" w="9525">
                     <a:solidFill>
                       <a:srgbClr val="000000"/>
                     </a:solidFill>
@@ -9944,7 +9949,7 @@
               </a:ln>
               <a:extLst>
                 <a:ext uri="{91240B29-F687-4f45-9708-019B960494DF}">
-                  <a14:hiddenLine xmlns:a14="http://schemas.microsoft.com/office/drawing/2010/main" xmlns="" w="9525">
+                  <a14:hiddenLine xmlns="" xmlns:a14="http://schemas.microsoft.com/office/drawing/2010/main" w="9525">
                     <a:solidFill>
                       <a:srgbClr val="000000"/>
                     </a:solidFill>
@@ -10006,7 +10011,7 @@
               </a:ln>
               <a:extLst>
                 <a:ext uri="{91240B29-F687-4f45-9708-019B960494DF}">
-                  <a14:hiddenLine xmlns:a14="http://schemas.microsoft.com/office/drawing/2010/main" xmlns="" w="9525">
+                  <a14:hiddenLine xmlns="" xmlns:a14="http://schemas.microsoft.com/office/drawing/2010/main" w="9525">
                     <a:solidFill>
                       <a:srgbClr val="000000"/>
                     </a:solidFill>
@@ -10068,7 +10073,7 @@
               </a:ln>
               <a:extLst>
                 <a:ext uri="{91240B29-F687-4f45-9708-019B960494DF}">
-                  <a14:hiddenLine xmlns:a14="http://schemas.microsoft.com/office/drawing/2010/main" xmlns="" w="9525">
+                  <a14:hiddenLine xmlns="" xmlns:a14="http://schemas.microsoft.com/office/drawing/2010/main" w="9525">
                     <a:solidFill>
                       <a:srgbClr val="000000"/>
                     </a:solidFill>
@@ -10158,7 +10163,7 @@
               </a:ln>
               <a:extLst>
                 <a:ext uri="{91240B29-F687-4f45-9708-019B960494DF}">
-                  <a14:hiddenLine xmlns:a14="http://schemas.microsoft.com/office/drawing/2010/main" xmlns="" w="9525">
+                  <a14:hiddenLine xmlns="" xmlns:a14="http://schemas.microsoft.com/office/drawing/2010/main" w="9525">
                     <a:solidFill>
                       <a:srgbClr val="000000"/>
                     </a:solidFill>
@@ -10192,7 +10197,7 @@
               </a:ln>
               <a:extLst>
                 <a:ext uri="{91240B29-F687-4f45-9708-019B960494DF}">
-                  <a14:hiddenLine xmlns:a14="http://schemas.microsoft.com/office/drawing/2010/main" xmlns="" w="9525">
+                  <a14:hiddenLine xmlns="" xmlns:a14="http://schemas.microsoft.com/office/drawing/2010/main" w="9525">
                     <a:solidFill>
                       <a:srgbClr val="000000"/>
                     </a:solidFill>
@@ -10257,7 +10262,7 @@
               </a:ln>
               <a:extLst>
                 <a:ext uri="{91240B29-F687-4f45-9708-019B960494DF}">
-                  <a14:hiddenLine xmlns:a14="http://schemas.microsoft.com/office/drawing/2010/main" xmlns="" w="9525">
+                  <a14:hiddenLine xmlns="" xmlns:a14="http://schemas.microsoft.com/office/drawing/2010/main" w="9525">
                     <a:solidFill>
                       <a:srgbClr val="000000"/>
                     </a:solidFill>
@@ -10347,7 +10352,7 @@
               </a:ln>
               <a:extLst>
                 <a:ext uri="{91240B29-F687-4f45-9708-019B960494DF}">
-                  <a14:hiddenLine xmlns:a14="http://schemas.microsoft.com/office/drawing/2010/main" xmlns="" w="9525">
+                  <a14:hiddenLine xmlns="" xmlns:a14="http://schemas.microsoft.com/office/drawing/2010/main" w="9525">
                     <a:solidFill>
                       <a:srgbClr val="000000"/>
                     </a:solidFill>
@@ -10409,7 +10414,7 @@
               </a:ln>
               <a:extLst>
                 <a:ext uri="{91240B29-F687-4f45-9708-019B960494DF}">
-                  <a14:hiddenLine xmlns:a14="http://schemas.microsoft.com/office/drawing/2010/main" xmlns="" w="9525">
+                  <a14:hiddenLine xmlns="" xmlns:a14="http://schemas.microsoft.com/office/drawing/2010/main" w="9525">
                     <a:solidFill>
                       <a:srgbClr val="000000"/>
                     </a:solidFill>
@@ -10499,7 +10504,7 @@
               </a:ln>
               <a:extLst>
                 <a:ext uri="{91240B29-F687-4f45-9708-019B960494DF}">
-                  <a14:hiddenLine xmlns:a14="http://schemas.microsoft.com/office/drawing/2010/main" xmlns="" w="9525">
+                  <a14:hiddenLine xmlns="" xmlns:a14="http://schemas.microsoft.com/office/drawing/2010/main" w="9525">
                     <a:solidFill>
                       <a:srgbClr val="000000"/>
                     </a:solidFill>
@@ -10564,7 +10569,7 @@
               </a:ln>
               <a:extLst>
                 <a:ext uri="{91240B29-F687-4f45-9708-019B960494DF}">
-                  <a14:hiddenLine xmlns:a14="http://schemas.microsoft.com/office/drawing/2010/main" xmlns="" w="9525">
+                  <a14:hiddenLine xmlns="" xmlns:a14="http://schemas.microsoft.com/office/drawing/2010/main" w="9525">
                     <a:solidFill>
                       <a:srgbClr val="000000"/>
                     </a:solidFill>
@@ -10626,7 +10631,7 @@
               </a:ln>
               <a:extLst>
                 <a:ext uri="{91240B29-F687-4f45-9708-019B960494DF}">
-                  <a14:hiddenLine xmlns:a14="http://schemas.microsoft.com/office/drawing/2010/main" xmlns="" w="9525">
+                  <a14:hiddenLine xmlns="" xmlns:a14="http://schemas.microsoft.com/office/drawing/2010/main" w="9525">
                     <a:solidFill>
                       <a:srgbClr val="000000"/>
                     </a:solidFill>
@@ -10716,7 +10721,7 @@
               </a:ln>
               <a:extLst>
                 <a:ext uri="{91240B29-F687-4f45-9708-019B960494DF}">
-                  <a14:hiddenLine xmlns:a14="http://schemas.microsoft.com/office/drawing/2010/main" xmlns="" w="9525">
+                  <a14:hiddenLine xmlns="" xmlns:a14="http://schemas.microsoft.com/office/drawing/2010/main" w="9525">
                     <a:solidFill>
                       <a:srgbClr val="000000"/>
                     </a:solidFill>
@@ -10806,7 +10811,7 @@
               </a:ln>
               <a:extLst>
                 <a:ext uri="{91240B29-F687-4f45-9708-019B960494DF}">
-                  <a14:hiddenLine xmlns:a14="http://schemas.microsoft.com/office/drawing/2010/main" xmlns="" w="9525">
+                  <a14:hiddenLine xmlns="" xmlns:a14="http://schemas.microsoft.com/office/drawing/2010/main" w="9525">
                     <a:solidFill>
                       <a:srgbClr val="000000"/>
                     </a:solidFill>
@@ -10871,7 +10876,7 @@
               </a:ln>
               <a:extLst>
                 <a:ext uri="{91240B29-F687-4f45-9708-019B960494DF}">
-                  <a14:hiddenLine xmlns:a14="http://schemas.microsoft.com/office/drawing/2010/main" xmlns="" w="9525">
+                  <a14:hiddenLine xmlns="" xmlns:a14="http://schemas.microsoft.com/office/drawing/2010/main" w="9525">
                     <a:solidFill>
                       <a:srgbClr val="000000"/>
                     </a:solidFill>
@@ -10991,7 +10996,7 @@
               </a:ln>
               <a:extLst>
                 <a:ext uri="{91240B29-F687-4f45-9708-019B960494DF}">
-                  <a14:hiddenLine xmlns:a14="http://schemas.microsoft.com/office/drawing/2010/main" xmlns="" w="9525">
+                  <a14:hiddenLine xmlns="" xmlns:a14="http://schemas.microsoft.com/office/drawing/2010/main" w="9525">
                     <a:solidFill>
                       <a:srgbClr val="000000"/>
                     </a:solidFill>
@@ -11072,7 +11077,7 @@
               </a:ln>
               <a:extLst>
                 <a:ext uri="{91240B29-F687-4f45-9708-019B960494DF}">
-                  <a14:hiddenLine xmlns:a14="http://schemas.microsoft.com/office/drawing/2010/main" xmlns="" w="9525">
+                  <a14:hiddenLine xmlns="" xmlns:a14="http://schemas.microsoft.com/office/drawing/2010/main" w="9525">
                     <a:solidFill>
                       <a:srgbClr val="000000"/>
                     </a:solidFill>
@@ -11187,7 +11192,7 @@
               </a:ln>
               <a:extLst>
                 <a:ext uri="{91240B29-F687-4f45-9708-019B960494DF}">
-                  <a14:hiddenLine xmlns:a14="http://schemas.microsoft.com/office/drawing/2010/main" xmlns="" w="9525">
+                  <a14:hiddenLine xmlns="" xmlns:a14="http://schemas.microsoft.com/office/drawing/2010/main" w="9525">
                     <a:solidFill>
                       <a:srgbClr val="000000"/>
                     </a:solidFill>
@@ -11277,7 +11282,7 @@
               </a:ln>
               <a:extLst>
                 <a:ext uri="{91240B29-F687-4f45-9708-019B960494DF}">
-                  <a14:hiddenLine xmlns:a14="http://schemas.microsoft.com/office/drawing/2010/main" xmlns="" w="9525">
+                  <a14:hiddenLine xmlns="" xmlns:a14="http://schemas.microsoft.com/office/drawing/2010/main" w="9525">
                     <a:solidFill>
                       <a:srgbClr val="000000"/>
                     </a:solidFill>
@@ -11342,7 +11347,7 @@
               </a:ln>
               <a:extLst>
                 <a:ext uri="{91240B29-F687-4f45-9708-019B960494DF}">
-                  <a14:hiddenLine xmlns:a14="http://schemas.microsoft.com/office/drawing/2010/main" xmlns="" w="9525">
+                  <a14:hiddenLine xmlns="" xmlns:a14="http://schemas.microsoft.com/office/drawing/2010/main" w="9525">
                     <a:solidFill>
                       <a:srgbClr val="000000"/>
                     </a:solidFill>
@@ -11432,7 +11437,7 @@
               </a:ln>
               <a:extLst>
                 <a:ext uri="{91240B29-F687-4f45-9708-019B960494DF}">
-                  <a14:hiddenLine xmlns:a14="http://schemas.microsoft.com/office/drawing/2010/main" xmlns="" w="9525">
+                  <a14:hiddenLine xmlns="" xmlns:a14="http://schemas.microsoft.com/office/drawing/2010/main" w="9525">
                     <a:solidFill>
                       <a:srgbClr val="000000"/>
                     </a:solidFill>
@@ -11500,7 +11505,7 @@
               </a:ln>
               <a:extLst>
                 <a:ext uri="{91240B29-F687-4f45-9708-019B960494DF}">
-                  <a14:hiddenLine xmlns:a14="http://schemas.microsoft.com/office/drawing/2010/main" xmlns="" w="9525">
+                  <a14:hiddenLine xmlns="" xmlns:a14="http://schemas.microsoft.com/office/drawing/2010/main" w="9525">
                     <a:solidFill>
                       <a:srgbClr val="000000"/>
                     </a:solidFill>
@@ -11590,7 +11595,7 @@
               </a:ln>
               <a:extLst>
                 <a:ext uri="{91240B29-F687-4f45-9708-019B960494DF}">
-                  <a14:hiddenLine xmlns:a14="http://schemas.microsoft.com/office/drawing/2010/main" xmlns="" w="9525">
+                  <a14:hiddenLine xmlns="" xmlns:a14="http://schemas.microsoft.com/office/drawing/2010/main" w="9525">
                     <a:solidFill>
                       <a:srgbClr val="000000"/>
                     </a:solidFill>
@@ -11658,7 +11663,7 @@
               </a:ln>
               <a:extLst>
                 <a:ext uri="{91240B29-F687-4f45-9708-019B960494DF}">
-                  <a14:hiddenLine xmlns:a14="http://schemas.microsoft.com/office/drawing/2010/main" xmlns="" w="9525">
+                  <a14:hiddenLine xmlns="" xmlns:a14="http://schemas.microsoft.com/office/drawing/2010/main" w="9525">
                     <a:solidFill>
                       <a:srgbClr val="000000"/>
                     </a:solidFill>
@@ -11748,7 +11753,7 @@
               </a:ln>
               <a:extLst>
                 <a:ext uri="{91240B29-F687-4f45-9708-019B960494DF}">
-                  <a14:hiddenLine xmlns:a14="http://schemas.microsoft.com/office/drawing/2010/main" xmlns="" w="9525">
+                  <a14:hiddenLine xmlns="" xmlns:a14="http://schemas.microsoft.com/office/drawing/2010/main" w="9525">
                     <a:solidFill>
                       <a:srgbClr val="000000"/>
                     </a:solidFill>
@@ -11782,7 +11787,7 @@
               </a:ln>
               <a:extLst>
                 <a:ext uri="{91240B29-F687-4f45-9708-019B960494DF}">
-                  <a14:hiddenLine xmlns:a14="http://schemas.microsoft.com/office/drawing/2010/main" xmlns="" w="9525">
+                  <a14:hiddenLine xmlns="" xmlns:a14="http://schemas.microsoft.com/office/drawing/2010/main" w="9525">
                     <a:solidFill>
                       <a:srgbClr val="000000"/>
                     </a:solidFill>
@@ -12390,15 +12395,7 @@
           <a:p>
             <a:r>
               <a:rPr lang="en-US" dirty="0"/>
-              <a:t>The </a:t>
-            </a:r>
-            <a:r>
-              <a:rPr lang="en-US" dirty="0" err="1"/>
-              <a:t>gps</a:t>
-            </a:r>
-            <a:r>
-              <a:rPr lang="en-US" dirty="0"/>
-              <a:t> that surrounds you</a:t>
+              <a:t>The GPS that surrounds you</a:t>
             </a:r>
           </a:p>
         </p:txBody>

</xml_diff>